<commit_message>
Designed more stages and fixed one
</commit_message>
<xml_diff>
--- a/11-15 rounds/Wait What - 12 rounds - comstock/Wait, what.pptx
+++ b/11-15 rounds/Wait What - 12 rounds - comstock/Wait, what.pptx
@@ -259,7 +259,7 @@
               <a:pPr>
                 <a:defRPr/>
               </a:pPr>
-              <a:t>10/25/2019</a:t>
+              <a:t>11/8/2019</a:t>
             </a:fld>
             <a:endParaRPr lang="en-US"/>
           </a:p>
@@ -4160,14 +4160,14 @@
           <p:nvPr>
             <p:extLst>
               <p:ext uri="{D42A27DB-BD31-4B8C-83A1-F6EECF244321}">
-                <p14:modId xmlns:p14="http://schemas.microsoft.com/office/powerpoint/2010/main" val="2262411137"/>
+                <p14:modId xmlns:p14="http://schemas.microsoft.com/office/powerpoint/2010/main" val="852258414"/>
               </p:ext>
             </p:extLst>
           </p:nvPr>
         </p:nvGraphicFramePr>
         <p:xfrm>
           <a:off x="180474" y="223710"/>
-          <a:ext cx="7025777" cy="2877827"/>
+          <a:ext cx="7025777" cy="2906964"/>
         </p:xfrm>
         <a:graphic>
           <a:graphicData uri="http://schemas.openxmlformats.org/drawingml/2006/table">
@@ -5009,7 +5009,7 @@
                           <a:ea typeface="ＭＳ Ｐゴシック" pitchFamily="-112" charset="-128"/>
                           <a:cs typeface="Times New Roman" pitchFamily="-112" charset="0"/>
                         </a:rPr>
-                        <a:t>RULES: The paper targets are one array and the steel are another.</a:t>
+                        <a:t>RULES: The paper targets are one array and the steel are another. The stomp pad is not part of the shooting area. You may not touch the stomp box prior to the start signal.</a:t>
                       </a:r>
                     </a:p>
                   </a:txBody>
@@ -5355,7 +5355,7 @@
         <p:spPr>
           <a:xfrm>
             <a:off x="341832" y="384561"/>
-            <a:ext cx="6699903" cy="4801314"/>
+            <a:ext cx="6699903" cy="5632311"/>
           </a:xfrm>
           <a:prstGeom prst="rect">
             <a:avLst/>
@@ -5412,6 +5412,15 @@
             <a:r>
               <a:rPr lang="en-US" dirty="0"/>
               <a:t>Upon start signal, engage the steel or the paper, perform a mandatory reload, then engage the remaining array. The left mini popper or the stomp pad will activate the swinger.</a:t>
+            </a:r>
+          </a:p>
+          <a:p>
+            <a:endParaRPr lang="en-US" dirty="0"/>
+          </a:p>
+          <a:p>
+            <a:r>
+              <a:rPr lang="en-US" dirty="0"/>
+              <a:t>The stomp pad is not part of the shooting area. You may not touch the stomp box prior to the start signal.</a:t>
             </a:r>
           </a:p>
         </p:txBody>

</xml_diff>